<commit_message>
FISA64 - interim update
</commit_message>
<xml_diff>
--- a/FISA64/trunk/doc/FISA64 Pipeline2.pptx
+++ b/FISA64/trunk/doc/FISA64 Pipeline2.pptx
@@ -288,7 +288,7 @@
           <a:p>
             <a:fld id="{EFDF9781-FB22-4B35-BA8B-EF448161C4A9}" type="datetimeFigureOut">
               <a:rPr lang="en-CA" smtClean="0"/>
-              <a:t>2014-12-26</a:t>
+              <a:t>2014-12-29</a:t>
             </a:fld>
             <a:endParaRPr lang="en-CA"/>
           </a:p>
@@ -458,7 +458,7 @@
           <a:p>
             <a:fld id="{EFDF9781-FB22-4B35-BA8B-EF448161C4A9}" type="datetimeFigureOut">
               <a:rPr lang="en-CA" smtClean="0"/>
-              <a:t>2014-12-26</a:t>
+              <a:t>2014-12-29</a:t>
             </a:fld>
             <a:endParaRPr lang="en-CA"/>
           </a:p>
@@ -638,7 +638,7 @@
           <a:p>
             <a:fld id="{EFDF9781-FB22-4B35-BA8B-EF448161C4A9}" type="datetimeFigureOut">
               <a:rPr lang="en-CA" smtClean="0"/>
-              <a:t>2014-12-26</a:t>
+              <a:t>2014-12-29</a:t>
             </a:fld>
             <a:endParaRPr lang="en-CA"/>
           </a:p>
@@ -808,7 +808,7 @@
           <a:p>
             <a:fld id="{EFDF9781-FB22-4B35-BA8B-EF448161C4A9}" type="datetimeFigureOut">
               <a:rPr lang="en-CA" smtClean="0"/>
-              <a:t>2014-12-26</a:t>
+              <a:t>2014-12-29</a:t>
             </a:fld>
             <a:endParaRPr lang="en-CA"/>
           </a:p>
@@ -1054,7 +1054,7 @@
           <a:p>
             <a:fld id="{EFDF9781-FB22-4B35-BA8B-EF448161C4A9}" type="datetimeFigureOut">
               <a:rPr lang="en-CA" smtClean="0"/>
-              <a:t>2014-12-26</a:t>
+              <a:t>2014-12-29</a:t>
             </a:fld>
             <a:endParaRPr lang="en-CA"/>
           </a:p>
@@ -1342,7 +1342,7 @@
           <a:p>
             <a:fld id="{EFDF9781-FB22-4B35-BA8B-EF448161C4A9}" type="datetimeFigureOut">
               <a:rPr lang="en-CA" smtClean="0"/>
-              <a:t>2014-12-26</a:t>
+              <a:t>2014-12-29</a:t>
             </a:fld>
             <a:endParaRPr lang="en-CA"/>
           </a:p>
@@ -1764,7 +1764,7 @@
           <a:p>
             <a:fld id="{EFDF9781-FB22-4B35-BA8B-EF448161C4A9}" type="datetimeFigureOut">
               <a:rPr lang="en-CA" smtClean="0"/>
-              <a:t>2014-12-26</a:t>
+              <a:t>2014-12-29</a:t>
             </a:fld>
             <a:endParaRPr lang="en-CA"/>
           </a:p>
@@ -1882,7 +1882,7 @@
           <a:p>
             <a:fld id="{EFDF9781-FB22-4B35-BA8B-EF448161C4A9}" type="datetimeFigureOut">
               <a:rPr lang="en-CA" smtClean="0"/>
-              <a:t>2014-12-26</a:t>
+              <a:t>2014-12-29</a:t>
             </a:fld>
             <a:endParaRPr lang="en-CA"/>
           </a:p>
@@ -1977,7 +1977,7 @@
           <a:p>
             <a:fld id="{EFDF9781-FB22-4B35-BA8B-EF448161C4A9}" type="datetimeFigureOut">
               <a:rPr lang="en-CA" smtClean="0"/>
-              <a:t>2014-12-26</a:t>
+              <a:t>2014-12-29</a:t>
             </a:fld>
             <a:endParaRPr lang="en-CA"/>
           </a:p>
@@ -2254,7 +2254,7 @@
           <a:p>
             <a:fld id="{EFDF9781-FB22-4B35-BA8B-EF448161C4A9}" type="datetimeFigureOut">
               <a:rPr lang="en-CA" smtClean="0"/>
-              <a:t>2014-12-26</a:t>
+              <a:t>2014-12-29</a:t>
             </a:fld>
             <a:endParaRPr lang="en-CA"/>
           </a:p>
@@ -2507,7 +2507,7 @@
           <a:p>
             <a:fld id="{EFDF9781-FB22-4B35-BA8B-EF448161C4A9}" type="datetimeFigureOut">
               <a:rPr lang="en-CA" smtClean="0"/>
-              <a:t>2014-12-26</a:t>
+              <a:t>2014-12-29</a:t>
             </a:fld>
             <a:endParaRPr lang="en-CA"/>
           </a:p>
@@ -2720,7 +2720,7 @@
           <a:p>
             <a:fld id="{EFDF9781-FB22-4B35-BA8B-EF448161C4A9}" type="datetimeFigureOut">
               <a:rPr lang="en-CA" smtClean="0"/>
-              <a:t>2014-12-26</a:t>
+              <a:t>2014-12-29</a:t>
             </a:fld>
             <a:endParaRPr lang="en-CA"/>
           </a:p>
@@ -3097,43 +3097,14 @@
       </p:grpSpPr>
       <p:sp>
         <p:nvSpPr>
-          <p:cNvPr id="2" name="Title 1"/>
-          <p:cNvSpPr>
-            <a:spLocks noGrp="1"/>
-          </p:cNvSpPr>
-          <p:nvPr>
-            <p:ph type="ctrTitle"/>
-          </p:nvPr>
-        </p:nvSpPr>
-        <p:spPr>
-          <a:xfrm>
-            <a:off x="755576" y="260649"/>
-            <a:ext cx="7772400" cy="1152128"/>
-          </a:xfrm>
-        </p:spPr>
-        <p:txBody>
-          <a:bodyPr/>
-          <a:lstStyle/>
-          <a:p>
-            <a:pPr algn="l"/>
-            <a:r>
-              <a:rPr lang="en-CA" dirty="0" smtClean="0"/>
-              <a:t>FISA64 Pipeline</a:t>
-            </a:r>
-            <a:endParaRPr lang="en-CA" dirty="0"/>
-          </a:p>
-        </p:txBody>
-      </p:sp>
-      <p:sp>
-        <p:nvSpPr>
-          <p:cNvPr id="4" name="Rectangle 3"/>
+          <p:cNvPr id="60" name="Rectangle 59"/>
           <p:cNvSpPr/>
           <p:nvPr/>
         </p:nvSpPr>
         <p:spPr>
           <a:xfrm>
-            <a:off x="787943" y="2046894"/>
-            <a:ext cx="576064" cy="2304256"/>
+            <a:off x="4677911" y="5356798"/>
+            <a:ext cx="307877" cy="792088"/>
           </a:xfrm>
           <a:prstGeom prst="rect">
             <a:avLst/>
@@ -3156,13 +3127,13 @@
           </a:fontRef>
         </p:style>
         <p:txBody>
-          <a:bodyPr rtlCol="0" anchor="ctr"/>
+          <a:bodyPr vert="vert" rtlCol="0" anchor="ctr"/>
           <a:lstStyle/>
           <a:p>
             <a:pPr algn="ctr"/>
             <a:r>
               <a:rPr lang="en-CA" dirty="0" smtClean="0"/>
-              <a:t>IF</a:t>
+              <a:t>MI1</a:t>
             </a:r>
             <a:endParaRPr lang="en-CA" dirty="0"/>
           </a:p>
@@ -3170,14 +3141,14 @@
       </p:sp>
       <p:sp>
         <p:nvSpPr>
-          <p:cNvPr id="5" name="Rectangle 4"/>
+          <p:cNvPr id="62" name="Rectangle 61"/>
           <p:cNvSpPr/>
           <p:nvPr/>
         </p:nvSpPr>
         <p:spPr>
           <a:xfrm>
-            <a:off x="2451658" y="2036201"/>
-            <a:ext cx="576064" cy="2304256"/>
+            <a:off x="5003381" y="5356798"/>
+            <a:ext cx="307877" cy="792088"/>
           </a:xfrm>
           <a:prstGeom prst="rect">
             <a:avLst/>
@@ -3200,13 +3171,13 @@
           </a:fontRef>
         </p:style>
         <p:txBody>
-          <a:bodyPr rtlCol="0" anchor="ctr"/>
+          <a:bodyPr vert="vert" rtlCol="0" anchor="ctr"/>
           <a:lstStyle/>
           <a:p>
             <a:pPr algn="ctr"/>
             <a:r>
               <a:rPr lang="en-CA" dirty="0" smtClean="0"/>
-              <a:t>RF</a:t>
+              <a:t>MI2</a:t>
             </a:r>
             <a:endParaRPr lang="en-CA" dirty="0"/>
           </a:p>
@@ -3214,14 +3185,14 @@
       </p:sp>
       <p:sp>
         <p:nvSpPr>
-          <p:cNvPr id="6" name="Rectangle 5"/>
+          <p:cNvPr id="69" name="Rectangle 68"/>
           <p:cNvSpPr/>
           <p:nvPr/>
         </p:nvSpPr>
         <p:spPr>
           <a:xfrm>
-            <a:off x="3818105" y="2046894"/>
-            <a:ext cx="576064" cy="2304256"/>
+            <a:off x="5311258" y="5356798"/>
+            <a:ext cx="307877" cy="792088"/>
           </a:xfrm>
           <a:prstGeom prst="rect">
             <a:avLst/>
@@ -3244,13 +3215,13 @@
           </a:fontRef>
         </p:style>
         <p:txBody>
-          <a:bodyPr rtlCol="0" anchor="ctr"/>
+          <a:bodyPr vert="vert" rtlCol="0" anchor="ctr"/>
           <a:lstStyle/>
           <a:p>
             <a:pPr algn="ctr"/>
             <a:r>
               <a:rPr lang="en-CA" dirty="0" smtClean="0"/>
-              <a:t>EX</a:t>
+              <a:t>MI3</a:t>
             </a:r>
             <a:endParaRPr lang="en-CA" dirty="0"/>
           </a:p>
@@ -3258,14 +3229,14 @@
       </p:sp>
       <p:sp>
         <p:nvSpPr>
-          <p:cNvPr id="7" name="Rectangle 6"/>
+          <p:cNvPr id="71" name="Rectangle 70"/>
           <p:cNvSpPr/>
           <p:nvPr/>
         </p:nvSpPr>
         <p:spPr>
           <a:xfrm>
-            <a:off x="6902973" y="2036201"/>
-            <a:ext cx="576064" cy="2304256"/>
+            <a:off x="5618255" y="5356798"/>
+            <a:ext cx="307877" cy="792088"/>
           </a:xfrm>
           <a:prstGeom prst="rect">
             <a:avLst/>
@@ -3288,6 +3259,299 @@
           </a:fontRef>
         </p:style>
         <p:txBody>
+          <a:bodyPr vert="vert" rtlCol="0" anchor="ctr"/>
+          <a:lstStyle/>
+          <a:p>
+            <a:pPr algn="ctr"/>
+            <a:r>
+              <a:rPr lang="en-CA" dirty="0" smtClean="0"/>
+              <a:t>MI4</a:t>
+            </a:r>
+            <a:endParaRPr lang="en-CA" dirty="0"/>
+          </a:p>
+        </p:txBody>
+      </p:sp>
+      <p:sp>
+        <p:nvSpPr>
+          <p:cNvPr id="73" name="Rectangle 72"/>
+          <p:cNvSpPr/>
+          <p:nvPr/>
+        </p:nvSpPr>
+        <p:spPr>
+          <a:xfrm>
+            <a:off x="5926132" y="5356798"/>
+            <a:ext cx="307877" cy="792088"/>
+          </a:xfrm>
+          <a:prstGeom prst="rect">
+            <a:avLst/>
+          </a:prstGeom>
+        </p:spPr>
+        <p:style>
+          <a:lnRef idx="2">
+            <a:schemeClr val="accent1">
+              <a:shade val="50000"/>
+            </a:schemeClr>
+          </a:lnRef>
+          <a:fillRef idx="1">
+            <a:schemeClr val="accent1"/>
+          </a:fillRef>
+          <a:effectRef idx="0">
+            <a:schemeClr val="accent1"/>
+          </a:effectRef>
+          <a:fontRef idx="minor">
+            <a:schemeClr val="lt1"/>
+          </a:fontRef>
+        </p:style>
+        <p:txBody>
+          <a:bodyPr vert="vert" rtlCol="0" anchor="ctr"/>
+          <a:lstStyle/>
+          <a:p>
+            <a:pPr algn="ctr"/>
+            <a:r>
+              <a:rPr lang="en-CA" dirty="0" smtClean="0"/>
+              <a:t>MI5</a:t>
+            </a:r>
+            <a:endParaRPr lang="en-CA" dirty="0"/>
+          </a:p>
+        </p:txBody>
+      </p:sp>
+      <p:sp>
+        <p:nvSpPr>
+          <p:cNvPr id="75" name="Rectangle 74"/>
+          <p:cNvSpPr/>
+          <p:nvPr/>
+        </p:nvSpPr>
+        <p:spPr>
+          <a:xfrm>
+            <a:off x="6225002" y="5356798"/>
+            <a:ext cx="307877" cy="792088"/>
+          </a:xfrm>
+          <a:prstGeom prst="rect">
+            <a:avLst/>
+          </a:prstGeom>
+        </p:spPr>
+        <p:style>
+          <a:lnRef idx="2">
+            <a:schemeClr val="accent1">
+              <a:shade val="50000"/>
+            </a:schemeClr>
+          </a:lnRef>
+          <a:fillRef idx="1">
+            <a:schemeClr val="accent1"/>
+          </a:fillRef>
+          <a:effectRef idx="0">
+            <a:schemeClr val="accent1"/>
+          </a:effectRef>
+          <a:fontRef idx="minor">
+            <a:schemeClr val="lt1"/>
+          </a:fontRef>
+        </p:style>
+        <p:txBody>
+          <a:bodyPr vert="vert" rtlCol="0" anchor="ctr"/>
+          <a:lstStyle/>
+          <a:p>
+            <a:pPr algn="ctr"/>
+            <a:r>
+              <a:rPr lang="en-CA" dirty="0" smtClean="0"/>
+              <a:t>MI6</a:t>
+            </a:r>
+            <a:endParaRPr lang="en-CA" dirty="0"/>
+          </a:p>
+        </p:txBody>
+      </p:sp>
+      <p:sp>
+        <p:nvSpPr>
+          <p:cNvPr id="2" name="Title 1"/>
+          <p:cNvSpPr>
+            <a:spLocks noGrp="1"/>
+          </p:cNvSpPr>
+          <p:nvPr>
+            <p:ph type="ctrTitle"/>
+          </p:nvPr>
+        </p:nvSpPr>
+        <p:spPr>
+          <a:xfrm>
+            <a:off x="432366" y="50356"/>
+            <a:ext cx="7772400" cy="980728"/>
+          </a:xfrm>
+        </p:spPr>
+        <p:txBody>
+          <a:bodyPr/>
+          <a:lstStyle/>
+          <a:p>
+            <a:pPr algn="l"/>
+            <a:r>
+              <a:rPr lang="en-CA" dirty="0" smtClean="0"/>
+              <a:t>FISA64 Pipeline</a:t>
+            </a:r>
+            <a:endParaRPr lang="en-CA" dirty="0"/>
+          </a:p>
+        </p:txBody>
+      </p:sp>
+      <p:sp>
+        <p:nvSpPr>
+          <p:cNvPr id="4" name="Rectangle 3"/>
+          <p:cNvSpPr/>
+          <p:nvPr/>
+        </p:nvSpPr>
+        <p:spPr>
+          <a:xfrm>
+            <a:off x="787943" y="1421102"/>
+            <a:ext cx="576064" cy="2304256"/>
+          </a:xfrm>
+          <a:prstGeom prst="rect">
+            <a:avLst/>
+          </a:prstGeom>
+        </p:spPr>
+        <p:style>
+          <a:lnRef idx="2">
+            <a:schemeClr val="accent1">
+              <a:shade val="50000"/>
+            </a:schemeClr>
+          </a:lnRef>
+          <a:fillRef idx="1">
+            <a:schemeClr val="accent1"/>
+          </a:fillRef>
+          <a:effectRef idx="0">
+            <a:schemeClr val="accent1"/>
+          </a:effectRef>
+          <a:fontRef idx="minor">
+            <a:schemeClr val="lt1"/>
+          </a:fontRef>
+        </p:style>
+        <p:txBody>
+          <a:bodyPr rtlCol="0" anchor="ctr"/>
+          <a:lstStyle/>
+          <a:p>
+            <a:pPr algn="ctr"/>
+            <a:r>
+              <a:rPr lang="en-CA" dirty="0" smtClean="0"/>
+              <a:t>IF</a:t>
+            </a:r>
+            <a:endParaRPr lang="en-CA" dirty="0"/>
+          </a:p>
+        </p:txBody>
+      </p:sp>
+      <p:sp>
+        <p:nvSpPr>
+          <p:cNvPr id="5" name="Rectangle 4"/>
+          <p:cNvSpPr/>
+          <p:nvPr/>
+        </p:nvSpPr>
+        <p:spPr>
+          <a:xfrm>
+            <a:off x="2451658" y="1410409"/>
+            <a:ext cx="576064" cy="2304256"/>
+          </a:xfrm>
+          <a:prstGeom prst="rect">
+            <a:avLst/>
+          </a:prstGeom>
+        </p:spPr>
+        <p:style>
+          <a:lnRef idx="2">
+            <a:schemeClr val="accent1">
+              <a:shade val="50000"/>
+            </a:schemeClr>
+          </a:lnRef>
+          <a:fillRef idx="1">
+            <a:schemeClr val="accent1"/>
+          </a:fillRef>
+          <a:effectRef idx="0">
+            <a:schemeClr val="accent1"/>
+          </a:effectRef>
+          <a:fontRef idx="minor">
+            <a:schemeClr val="lt1"/>
+          </a:fontRef>
+        </p:style>
+        <p:txBody>
+          <a:bodyPr rtlCol="0" anchor="ctr"/>
+          <a:lstStyle/>
+          <a:p>
+            <a:pPr algn="ctr"/>
+            <a:r>
+              <a:rPr lang="en-CA" dirty="0" smtClean="0"/>
+              <a:t>RF</a:t>
+            </a:r>
+            <a:endParaRPr lang="en-CA" dirty="0"/>
+          </a:p>
+        </p:txBody>
+      </p:sp>
+      <p:sp>
+        <p:nvSpPr>
+          <p:cNvPr id="6" name="Rectangle 5"/>
+          <p:cNvSpPr/>
+          <p:nvPr/>
+        </p:nvSpPr>
+        <p:spPr>
+          <a:xfrm>
+            <a:off x="3818105" y="1421102"/>
+            <a:ext cx="576064" cy="2304256"/>
+          </a:xfrm>
+          <a:prstGeom prst="rect">
+            <a:avLst/>
+          </a:prstGeom>
+        </p:spPr>
+        <p:style>
+          <a:lnRef idx="2">
+            <a:schemeClr val="accent1">
+              <a:shade val="50000"/>
+            </a:schemeClr>
+          </a:lnRef>
+          <a:fillRef idx="1">
+            <a:schemeClr val="accent1"/>
+          </a:fillRef>
+          <a:effectRef idx="0">
+            <a:schemeClr val="accent1"/>
+          </a:effectRef>
+          <a:fontRef idx="minor">
+            <a:schemeClr val="lt1"/>
+          </a:fontRef>
+        </p:style>
+        <p:txBody>
+          <a:bodyPr rtlCol="0" anchor="ctr"/>
+          <a:lstStyle/>
+          <a:p>
+            <a:pPr algn="ctr"/>
+            <a:r>
+              <a:rPr lang="en-CA" dirty="0" smtClean="0"/>
+              <a:t>EX</a:t>
+            </a:r>
+            <a:endParaRPr lang="en-CA" dirty="0"/>
+          </a:p>
+        </p:txBody>
+      </p:sp>
+      <p:sp>
+        <p:nvSpPr>
+          <p:cNvPr id="7" name="Rectangle 6"/>
+          <p:cNvSpPr/>
+          <p:nvPr/>
+        </p:nvSpPr>
+        <p:spPr>
+          <a:xfrm>
+            <a:off x="6902973" y="1410409"/>
+            <a:ext cx="576064" cy="2304256"/>
+          </a:xfrm>
+          <a:prstGeom prst="rect">
+            <a:avLst/>
+          </a:prstGeom>
+        </p:spPr>
+        <p:style>
+          <a:lnRef idx="2">
+            <a:schemeClr val="accent1">
+              <a:shade val="50000"/>
+            </a:schemeClr>
+          </a:lnRef>
+          <a:fillRef idx="1">
+            <a:schemeClr val="accent1"/>
+          </a:fillRef>
+          <a:effectRef idx="0">
+            <a:schemeClr val="accent1"/>
+          </a:effectRef>
+          <a:fontRef idx="minor">
+            <a:schemeClr val="lt1"/>
+          </a:fontRef>
+        </p:style>
+        <p:txBody>
           <a:bodyPr rtlCol="0" anchor="ctr"/>
           <a:lstStyle/>
           <a:p>
@@ -3308,7 +3572,7 @@
         </p:nvSpPr>
         <p:spPr>
           <a:xfrm>
-            <a:off x="7916734" y="2046894"/>
+            <a:off x="7916734" y="1421102"/>
             <a:ext cx="576064" cy="2304256"/>
           </a:xfrm>
           <a:prstGeom prst="rect">
@@ -3360,7 +3624,7 @@
         </p:nvCxnSpPr>
         <p:spPr>
           <a:xfrm>
-            <a:off x="7479037" y="3188329"/>
+            <a:off x="7479037" y="2562537"/>
             <a:ext cx="437697" cy="10693"/>
           </a:xfrm>
           <a:prstGeom prst="straightConnector1">
@@ -3393,7 +3657,7 @@
         </p:nvSpPr>
         <p:spPr>
           <a:xfrm>
-            <a:off x="1653929" y="4850841"/>
+            <a:off x="1653929" y="4225049"/>
             <a:ext cx="286142" cy="792088"/>
           </a:xfrm>
           <a:prstGeom prst="rect">
@@ -3437,7 +3701,7 @@
         </p:nvSpPr>
         <p:spPr>
           <a:xfrm>
-            <a:off x="1940071" y="4850841"/>
+            <a:off x="1940071" y="4225049"/>
             <a:ext cx="332999" cy="792088"/>
           </a:xfrm>
           <a:prstGeom prst="rect">
@@ -3481,7 +3745,7 @@
         </p:nvSpPr>
         <p:spPr>
           <a:xfrm>
-            <a:off x="4718390" y="4844662"/>
+            <a:off x="4718390" y="4218870"/>
             <a:ext cx="307877" cy="792088"/>
           </a:xfrm>
           <a:prstGeom prst="rect">
@@ -3525,7 +3789,7 @@
         </p:nvSpPr>
         <p:spPr>
           <a:xfrm>
-            <a:off x="5026267" y="4857021"/>
+            <a:off x="5026267" y="4231229"/>
             <a:ext cx="307877" cy="792088"/>
           </a:xfrm>
           <a:prstGeom prst="rect">
@@ -3569,7 +3833,7 @@
         </p:nvSpPr>
         <p:spPr>
           <a:xfrm>
-            <a:off x="5618256" y="4844662"/>
+            <a:off x="5618256" y="4218870"/>
             <a:ext cx="307877" cy="792088"/>
           </a:xfrm>
           <a:prstGeom prst="rect">
@@ -3613,7 +3877,7 @@
         </p:nvSpPr>
         <p:spPr>
           <a:xfrm>
-            <a:off x="5334144" y="4844662"/>
+            <a:off x="5334144" y="4218870"/>
             <a:ext cx="307877" cy="792088"/>
           </a:xfrm>
           <a:prstGeom prst="rect">
@@ -3657,7 +3921,7 @@
         </p:nvSpPr>
         <p:spPr>
           <a:xfrm>
-            <a:off x="5926133" y="4857021"/>
+            <a:off x="5926133" y="4231229"/>
             <a:ext cx="307877" cy="792088"/>
           </a:xfrm>
           <a:prstGeom prst="rect">
@@ -3701,7 +3965,7 @@
         </p:nvSpPr>
         <p:spPr>
           <a:xfrm>
-            <a:off x="6234010" y="4857021"/>
+            <a:off x="6234010" y="4231229"/>
             <a:ext cx="307877" cy="792088"/>
           </a:xfrm>
           <a:prstGeom prst="rect">
@@ -3748,7 +4012,7 @@
         </p:nvCxnSpPr>
         <p:spPr>
           <a:xfrm flipV="1">
-            <a:off x="4394169" y="3188329"/>
+            <a:off x="4394169" y="2562537"/>
             <a:ext cx="2508804" cy="10693"/>
           </a:xfrm>
           <a:prstGeom prst="straightConnector1">
@@ -3781,7 +4045,7 @@
         </p:nvCxnSpPr>
         <p:spPr>
           <a:xfrm>
-            <a:off x="4394169" y="3942977"/>
+            <a:off x="4394169" y="3317185"/>
             <a:ext cx="138189" cy="0"/>
           </a:xfrm>
           <a:prstGeom prst="line">
@@ -3811,7 +4075,7 @@
         </p:nvCxnSpPr>
         <p:spPr>
           <a:xfrm>
-            <a:off x="4532358" y="3942977"/>
+            <a:off x="4532358" y="3317185"/>
             <a:ext cx="0" cy="1297729"/>
           </a:xfrm>
           <a:prstGeom prst="line">
@@ -3843,7 +4107,7 @@
         </p:nvCxnSpPr>
         <p:spPr>
           <a:xfrm>
-            <a:off x="4532358" y="5240706"/>
+            <a:off x="4532358" y="4614914"/>
             <a:ext cx="186032" cy="0"/>
           </a:xfrm>
           <a:prstGeom prst="straightConnector1">
@@ -3878,7 +4142,7 @@
         </p:nvCxnSpPr>
         <p:spPr>
           <a:xfrm flipV="1">
-            <a:off x="6541887" y="5240706"/>
+            <a:off x="6541887" y="4614914"/>
             <a:ext cx="150711" cy="12359"/>
           </a:xfrm>
           <a:prstGeom prst="line">
@@ -3908,7 +4172,7 @@
         </p:nvCxnSpPr>
         <p:spPr>
           <a:xfrm flipV="1">
-            <a:off x="6692598" y="3942977"/>
+            <a:off x="6692598" y="3317185"/>
             <a:ext cx="0" cy="1297729"/>
           </a:xfrm>
           <a:prstGeom prst="line">
@@ -3938,7 +4202,7 @@
         </p:nvCxnSpPr>
         <p:spPr>
           <a:xfrm>
-            <a:off x="6692598" y="3942977"/>
+            <a:off x="6692598" y="3317185"/>
             <a:ext cx="210375" cy="0"/>
           </a:xfrm>
           <a:prstGeom prst="straightConnector1">
@@ -3971,7 +4235,7 @@
         </p:nvCxnSpPr>
         <p:spPr>
           <a:xfrm flipV="1">
-            <a:off x="4625374" y="1867104"/>
+            <a:off x="4625374" y="1241312"/>
             <a:ext cx="0" cy="1331918"/>
           </a:xfrm>
           <a:prstGeom prst="line">
@@ -4001,7 +4265,7 @@
         </p:nvCxnSpPr>
         <p:spPr>
           <a:xfrm flipH="1">
-            <a:off x="3668263" y="1867104"/>
+            <a:off x="3668263" y="1241312"/>
             <a:ext cx="957111" cy="0"/>
           </a:xfrm>
           <a:prstGeom prst="line">
@@ -4031,7 +4295,7 @@
         </p:nvCxnSpPr>
         <p:spPr>
           <a:xfrm>
-            <a:off x="3668263" y="1867104"/>
+            <a:off x="3668263" y="1241312"/>
             <a:ext cx="0" cy="576064"/>
           </a:xfrm>
           <a:prstGeom prst="line">
@@ -4061,7 +4325,7 @@
         </p:nvCxnSpPr>
         <p:spPr>
           <a:xfrm>
-            <a:off x="3668263" y="2443168"/>
+            <a:off x="3668263" y="1817376"/>
             <a:ext cx="149842" cy="0"/>
           </a:xfrm>
           <a:prstGeom prst="straightConnector1">
@@ -4094,7 +4358,7 @@
         </p:nvCxnSpPr>
         <p:spPr>
           <a:xfrm flipV="1">
-            <a:off x="7697885" y="1651080"/>
+            <a:off x="7697885" y="1025288"/>
             <a:ext cx="0" cy="1547942"/>
           </a:xfrm>
           <a:prstGeom prst="line">
@@ -4124,7 +4388,7 @@
         </p:nvCxnSpPr>
         <p:spPr>
           <a:xfrm flipH="1">
-            <a:off x="3596255" y="1651080"/>
+            <a:off x="3596255" y="1025288"/>
             <a:ext cx="4101630" cy="0"/>
           </a:xfrm>
           <a:prstGeom prst="line">
@@ -4154,7 +4418,7 @@
         </p:nvCxnSpPr>
         <p:spPr>
           <a:xfrm>
-            <a:off x="3596255" y="1651080"/>
+            <a:off x="3596255" y="1025288"/>
             <a:ext cx="0" cy="1008112"/>
           </a:xfrm>
           <a:prstGeom prst="line">
@@ -4184,7 +4448,7 @@
         </p:nvCxnSpPr>
         <p:spPr>
           <a:xfrm>
-            <a:off x="3596255" y="2659192"/>
+            <a:off x="3596255" y="2033400"/>
             <a:ext cx="221850" cy="0"/>
           </a:xfrm>
           <a:prstGeom prst="straightConnector1">
@@ -4219,7 +4483,7 @@
         </p:nvCxnSpPr>
         <p:spPr>
           <a:xfrm>
-            <a:off x="8492798" y="3199022"/>
+            <a:off x="8492798" y="2573230"/>
             <a:ext cx="216025" cy="0"/>
           </a:xfrm>
           <a:prstGeom prst="line">
@@ -4249,7 +4513,7 @@
         </p:nvCxnSpPr>
         <p:spPr>
           <a:xfrm flipV="1">
-            <a:off x="8708823" y="1507064"/>
+            <a:off x="8708823" y="881272"/>
             <a:ext cx="0" cy="1681265"/>
           </a:xfrm>
           <a:prstGeom prst="line">
@@ -4279,7 +4543,7 @@
         </p:nvCxnSpPr>
         <p:spPr>
           <a:xfrm flipH="1">
-            <a:off x="3524247" y="1507064"/>
+            <a:off x="3524247" y="881272"/>
             <a:ext cx="5184576" cy="0"/>
           </a:xfrm>
           <a:prstGeom prst="line">
@@ -4309,7 +4573,7 @@
         </p:nvCxnSpPr>
         <p:spPr>
           <a:xfrm>
-            <a:off x="3524247" y="1507064"/>
+            <a:off x="3524247" y="881272"/>
             <a:ext cx="0" cy="1368152"/>
           </a:xfrm>
           <a:prstGeom prst="line">
@@ -4339,7 +4603,7 @@
         </p:nvCxnSpPr>
         <p:spPr>
           <a:xfrm>
-            <a:off x="3524247" y="2875216"/>
+            <a:off x="3524247" y="2249424"/>
             <a:ext cx="293858" cy="0"/>
           </a:xfrm>
           <a:prstGeom prst="straightConnector1">
@@ -4375,7 +4639,7 @@
         </p:nvCxnSpPr>
         <p:spPr>
           <a:xfrm>
-            <a:off x="3027722" y="3188329"/>
+            <a:off x="3027722" y="2562537"/>
             <a:ext cx="790383" cy="10693"/>
           </a:xfrm>
           <a:prstGeom prst="straightConnector1">
@@ -4411,7 +4675,7 @@
         </p:nvCxnSpPr>
         <p:spPr>
           <a:xfrm flipV="1">
-            <a:off x="1364007" y="3188329"/>
+            <a:off x="1364007" y="2562537"/>
             <a:ext cx="1087651" cy="10693"/>
           </a:xfrm>
           <a:prstGeom prst="straightConnector1">
@@ -4444,7 +4708,7 @@
         </p:nvCxnSpPr>
         <p:spPr>
           <a:xfrm>
-            <a:off x="1364007" y="3942977"/>
+            <a:off x="1364007" y="3317185"/>
             <a:ext cx="144016" cy="0"/>
           </a:xfrm>
           <a:prstGeom prst="line">
@@ -4474,7 +4738,7 @@
         </p:nvCxnSpPr>
         <p:spPr>
           <a:xfrm>
-            <a:off x="1508023" y="3942977"/>
+            <a:off x="1508023" y="3317185"/>
             <a:ext cx="0" cy="1310088"/>
           </a:xfrm>
           <a:prstGeom prst="line">
@@ -4506,7 +4770,7 @@
         </p:nvCxnSpPr>
         <p:spPr>
           <a:xfrm>
-            <a:off x="1508023" y="5240706"/>
+            <a:off x="1508023" y="4614914"/>
             <a:ext cx="145906" cy="6179"/>
           </a:xfrm>
           <a:prstGeom prst="straightConnector1">
@@ -4541,7 +4805,7 @@
         </p:nvCxnSpPr>
         <p:spPr>
           <a:xfrm>
-            <a:off x="2273070" y="5246885"/>
+            <a:off x="2273070" y="4621093"/>
             <a:ext cx="178588" cy="6180"/>
           </a:xfrm>
           <a:prstGeom prst="line">
@@ -4571,7 +4835,7 @@
         </p:nvCxnSpPr>
         <p:spPr>
           <a:xfrm>
-            <a:off x="2451658" y="5253065"/>
+            <a:off x="2451658" y="4627273"/>
             <a:ext cx="0" cy="646487"/>
           </a:xfrm>
           <a:prstGeom prst="line">
@@ -4601,7 +4865,7 @@
         </p:nvCxnSpPr>
         <p:spPr>
           <a:xfrm flipH="1">
-            <a:off x="571919" y="5899552"/>
+            <a:off x="571919" y="5273760"/>
             <a:ext cx="1879739" cy="0"/>
           </a:xfrm>
           <a:prstGeom prst="line">
@@ -4631,7 +4895,7 @@
         </p:nvCxnSpPr>
         <p:spPr>
           <a:xfrm flipV="1">
-            <a:off x="571919" y="3942977"/>
+            <a:off x="559123" y="3317185"/>
             <a:ext cx="0" cy="1956575"/>
           </a:xfrm>
           <a:prstGeom prst="line">
@@ -4661,7 +4925,7 @@
         </p:nvCxnSpPr>
         <p:spPr>
           <a:xfrm>
-            <a:off x="571919" y="3942977"/>
+            <a:off x="571919" y="3331778"/>
             <a:ext cx="216024" cy="0"/>
           </a:xfrm>
           <a:prstGeom prst="straightConnector1">
@@ -4694,8 +4958,8 @@
         </p:nvSpPr>
         <p:spPr>
           <a:xfrm>
-            <a:off x="4316335" y="4598021"/>
-            <a:ext cx="2586638" cy="1769583"/>
+            <a:off x="4194763" y="3972229"/>
+            <a:ext cx="2586638" cy="2625123"/>
           </a:xfrm>
           <a:prstGeom prst="rect">
             <a:avLst/>
@@ -4751,7 +5015,7 @@
         </p:nvSpPr>
         <p:spPr>
           <a:xfrm>
-            <a:off x="1219991" y="4598021"/>
+            <a:off x="1219991" y="3972229"/>
             <a:ext cx="2088232" cy="1769583"/>
           </a:xfrm>
           <a:prstGeom prst="rect">
@@ -4808,7 +5072,7 @@
         </p:nvCxnSpPr>
         <p:spPr>
           <a:xfrm flipV="1">
-            <a:off x="5772194" y="3861048"/>
+            <a:off x="5772194" y="3235256"/>
             <a:ext cx="0" cy="983615"/>
           </a:xfrm>
           <a:prstGeom prst="line">
@@ -4838,7 +5102,7 @@
         </p:nvCxnSpPr>
         <p:spPr>
           <a:xfrm>
-            <a:off x="5772194" y="3861048"/>
+            <a:off x="5772194" y="3235256"/>
             <a:ext cx="1130779" cy="0"/>
           </a:xfrm>
           <a:prstGeom prst="straightConnector1">
@@ -4871,7 +5135,7 @@
         </p:nvCxnSpPr>
         <p:spPr>
           <a:xfrm flipV="1">
-            <a:off x="5180205" y="3789040"/>
+            <a:off x="5180205" y="3163248"/>
             <a:ext cx="0" cy="1055622"/>
           </a:xfrm>
           <a:prstGeom prst="line">
@@ -4901,7 +5165,7 @@
         </p:nvCxnSpPr>
         <p:spPr>
           <a:xfrm>
-            <a:off x="5180205" y="3789040"/>
+            <a:off x="5180205" y="3163248"/>
             <a:ext cx="1722768" cy="0"/>
           </a:xfrm>
           <a:prstGeom prst="straightConnector1">
@@ -4934,7 +5198,7 @@
         </p:nvCxnSpPr>
         <p:spPr>
           <a:xfrm flipV="1">
-            <a:off x="4872328" y="3645024"/>
+            <a:off x="4872328" y="3019232"/>
             <a:ext cx="0" cy="1205818"/>
           </a:xfrm>
           <a:prstGeom prst="line">
@@ -4964,7 +5228,7 @@
         </p:nvCxnSpPr>
         <p:spPr>
           <a:xfrm>
-            <a:off x="4872328" y="3669393"/>
+            <a:off x="4872328" y="3043601"/>
             <a:ext cx="2030645" cy="0"/>
           </a:xfrm>
           <a:prstGeom prst="straightConnector1">
@@ -4997,7 +5261,7 @@
         </p:nvSpPr>
         <p:spPr>
           <a:xfrm>
-            <a:off x="4850455" y="3965476"/>
+            <a:off x="4850455" y="3339684"/>
             <a:ext cx="430887" cy="632545"/>
           </a:xfrm>
           <a:prstGeom prst="rect">
@@ -5037,7 +5301,7 @@
         </p:nvSpPr>
         <p:spPr>
           <a:xfrm>
-            <a:off x="4564551" y="3782733"/>
+            <a:off x="4564551" y="3156941"/>
             <a:ext cx="307777" cy="799258"/>
           </a:xfrm>
           <a:prstGeom prst="rect">
@@ -5079,7 +5343,7 @@
         </p:nvSpPr>
         <p:spPr>
           <a:xfrm>
-            <a:off x="5441470" y="3929389"/>
+            <a:off x="5441470" y="3303597"/>
             <a:ext cx="430887" cy="671018"/>
           </a:xfrm>
           <a:prstGeom prst="rect">
@@ -5115,7 +5379,7 @@
         </p:nvSpPr>
         <p:spPr>
           <a:xfrm>
-            <a:off x="6387998" y="4247933"/>
+            <a:off x="6387998" y="3622141"/>
             <a:ext cx="307777" cy="310341"/>
           </a:xfrm>
           <a:prstGeom prst="rect">
@@ -5132,6 +5396,256 @@
             <a:r>
               <a:rPr lang="en-CA" sz="800" dirty="0" smtClean="0"/>
               <a:t>word</a:t>
+            </a:r>
+            <a:endParaRPr lang="en-CA" sz="800" dirty="0"/>
+          </a:p>
+        </p:txBody>
+      </p:sp>
+      <p:cxnSp>
+        <p:nvCxnSpPr>
+          <p:cNvPr id="21" name="Straight Connector 20"/>
+          <p:cNvCxnSpPr/>
+          <p:nvPr/>
+        </p:nvCxnSpPr>
+        <p:spPr>
+          <a:xfrm>
+            <a:off x="4532358" y="4618003"/>
+            <a:ext cx="0" cy="1134839"/>
+          </a:xfrm>
+          <a:prstGeom prst="line">
+            <a:avLst/>
+          </a:prstGeom>
+        </p:spPr>
+        <p:style>
+          <a:lnRef idx="1">
+            <a:schemeClr val="accent1"/>
+          </a:lnRef>
+          <a:fillRef idx="0">
+            <a:schemeClr val="accent1"/>
+          </a:fillRef>
+          <a:effectRef idx="0">
+            <a:schemeClr val="accent1"/>
+          </a:effectRef>
+          <a:fontRef idx="minor">
+            <a:schemeClr val="tx1"/>
+          </a:fontRef>
+        </p:style>
+      </p:cxnSp>
+      <p:cxnSp>
+        <p:nvCxnSpPr>
+          <p:cNvPr id="27" name="Straight Arrow Connector 26"/>
+          <p:cNvCxnSpPr>
+            <a:endCxn id="60" idx="1"/>
+          </p:cNvCxnSpPr>
+          <p:nvPr/>
+        </p:nvCxnSpPr>
+        <p:spPr>
+          <a:xfrm>
+            <a:off x="4532358" y="5752842"/>
+            <a:ext cx="145553" cy="0"/>
+          </a:xfrm>
+          <a:prstGeom prst="straightConnector1">
+            <a:avLst/>
+          </a:prstGeom>
+          <a:ln>
+            <a:tailEnd type="arrow"/>
+          </a:ln>
+        </p:spPr>
+        <p:style>
+          <a:lnRef idx="1">
+            <a:schemeClr val="accent1"/>
+          </a:lnRef>
+          <a:fillRef idx="0">
+            <a:schemeClr val="accent1"/>
+          </a:fillRef>
+          <a:effectRef idx="0">
+            <a:schemeClr val="accent1"/>
+          </a:effectRef>
+          <a:fontRef idx="minor">
+            <a:schemeClr val="tx1"/>
+          </a:fontRef>
+        </p:style>
+      </p:cxnSp>
+      <p:cxnSp>
+        <p:nvCxnSpPr>
+          <p:cNvPr id="34" name="Straight Connector 33"/>
+          <p:cNvCxnSpPr>
+            <a:stCxn id="75" idx="3"/>
+          </p:cNvCxnSpPr>
+          <p:nvPr/>
+        </p:nvCxnSpPr>
+        <p:spPr>
+          <a:xfrm>
+            <a:off x="6532879" y="5752842"/>
+            <a:ext cx="159719" cy="0"/>
+          </a:xfrm>
+          <a:prstGeom prst="line">
+            <a:avLst/>
+          </a:prstGeom>
+        </p:spPr>
+        <p:style>
+          <a:lnRef idx="1">
+            <a:schemeClr val="accent1"/>
+          </a:lnRef>
+          <a:fillRef idx="0">
+            <a:schemeClr val="accent1"/>
+          </a:fillRef>
+          <a:effectRef idx="0">
+            <a:schemeClr val="accent1"/>
+          </a:effectRef>
+          <a:fontRef idx="minor">
+            <a:schemeClr val="tx1"/>
+          </a:fontRef>
+        </p:style>
+      </p:cxnSp>
+      <p:cxnSp>
+        <p:nvCxnSpPr>
+          <p:cNvPr id="42" name="Straight Connector 41"/>
+          <p:cNvCxnSpPr/>
+          <p:nvPr/>
+        </p:nvCxnSpPr>
+        <p:spPr>
+          <a:xfrm flipH="1" flipV="1">
+            <a:off x="6692598" y="5185422"/>
+            <a:ext cx="3177" cy="567420"/>
+          </a:xfrm>
+          <a:prstGeom prst="line">
+            <a:avLst/>
+          </a:prstGeom>
+        </p:spPr>
+        <p:style>
+          <a:lnRef idx="1">
+            <a:schemeClr val="accent1"/>
+          </a:lnRef>
+          <a:fillRef idx="0">
+            <a:schemeClr val="accent1"/>
+          </a:fillRef>
+          <a:effectRef idx="0">
+            <a:schemeClr val="accent1"/>
+          </a:effectRef>
+          <a:fontRef idx="minor">
+            <a:schemeClr val="tx1"/>
+          </a:fontRef>
+        </p:style>
+      </p:cxnSp>
+      <p:cxnSp>
+        <p:nvCxnSpPr>
+          <p:cNvPr id="46" name="Straight Connector 45"/>
+          <p:cNvCxnSpPr/>
+          <p:nvPr/>
+        </p:nvCxnSpPr>
+        <p:spPr>
+          <a:xfrm flipH="1">
+            <a:off x="4625374" y="5185422"/>
+            <a:ext cx="2070401" cy="0"/>
+          </a:xfrm>
+          <a:prstGeom prst="line">
+            <a:avLst/>
+          </a:prstGeom>
+        </p:spPr>
+        <p:style>
+          <a:lnRef idx="1">
+            <a:schemeClr val="accent1"/>
+          </a:lnRef>
+          <a:fillRef idx="0">
+            <a:schemeClr val="accent1"/>
+          </a:fillRef>
+          <a:effectRef idx="0">
+            <a:schemeClr val="accent1"/>
+          </a:effectRef>
+          <a:fontRef idx="minor">
+            <a:schemeClr val="tx1"/>
+          </a:fontRef>
+        </p:style>
+      </p:cxnSp>
+      <p:cxnSp>
+        <p:nvCxnSpPr>
+          <p:cNvPr id="50" name="Straight Connector 49"/>
+          <p:cNvCxnSpPr/>
+          <p:nvPr/>
+        </p:nvCxnSpPr>
+        <p:spPr>
+          <a:xfrm flipV="1">
+            <a:off x="4605134" y="4857020"/>
+            <a:ext cx="0" cy="328402"/>
+          </a:xfrm>
+          <a:prstGeom prst="line">
+            <a:avLst/>
+          </a:prstGeom>
+        </p:spPr>
+        <p:style>
+          <a:lnRef idx="1">
+            <a:schemeClr val="accent1"/>
+          </a:lnRef>
+          <a:fillRef idx="0">
+            <a:schemeClr val="accent1"/>
+          </a:fillRef>
+          <a:effectRef idx="0">
+            <a:schemeClr val="accent1"/>
+          </a:effectRef>
+          <a:fontRef idx="minor">
+            <a:schemeClr val="tx1"/>
+          </a:fontRef>
+        </p:style>
+      </p:cxnSp>
+      <p:cxnSp>
+        <p:nvCxnSpPr>
+          <p:cNvPr id="54" name="Straight Arrow Connector 53"/>
+          <p:cNvCxnSpPr/>
+          <p:nvPr/>
+        </p:nvCxnSpPr>
+        <p:spPr>
+          <a:xfrm>
+            <a:off x="4625374" y="4857020"/>
+            <a:ext cx="93065" cy="0"/>
+          </a:xfrm>
+          <a:prstGeom prst="straightConnector1">
+            <a:avLst/>
+          </a:prstGeom>
+          <a:ln>
+            <a:tailEnd type="arrow"/>
+          </a:ln>
+        </p:spPr>
+        <p:style>
+          <a:lnRef idx="1">
+            <a:schemeClr val="accent1"/>
+          </a:lnRef>
+          <a:fillRef idx="0">
+            <a:schemeClr val="accent1"/>
+          </a:fillRef>
+          <a:effectRef idx="0">
+            <a:schemeClr val="accent1"/>
+          </a:effectRef>
+          <a:fontRef idx="minor">
+            <a:schemeClr val="tx1"/>
+          </a:fontRef>
+        </p:style>
+      </p:cxnSp>
+      <p:sp>
+        <p:nvSpPr>
+          <p:cNvPr id="85" name="TextBox 84"/>
+          <p:cNvSpPr txBox="1"/>
+          <p:nvPr/>
+        </p:nvSpPr>
+        <p:spPr>
+          <a:xfrm>
+            <a:off x="4317597" y="5165684"/>
+            <a:ext cx="307777" cy="792846"/>
+          </a:xfrm>
+          <a:prstGeom prst="rect">
+            <a:avLst/>
+          </a:prstGeom>
+          <a:noFill/>
+        </p:spPr>
+        <p:txBody>
+          <a:bodyPr vert="vert270" wrap="none" rtlCol="0">
+            <a:spAutoFit/>
+          </a:bodyPr>
+          <a:lstStyle/>
+          <a:p>
+            <a:r>
+              <a:rPr lang="en-CA" sz="800" dirty="0" smtClean="0"/>
+              <a:t>Memory indirect</a:t>
             </a:r>
             <a:endParaRPr lang="en-CA" sz="800" dirty="0"/>
           </a:p>

</xml_diff>